<commit_message>
Presentation update - fixed
</commit_message>
<xml_diff>
--- a/presentation/prezentacja_airflow.pptx
+++ b/presentation/prezentacja_airflow.pptx
@@ -125,6 +125,11 @@
       </a:defRPr>
     </a:lvl9pPr>
   </p:defaultTextStyle>
+  <p:extLst>
+    <p:ext uri="{EFAFB233-063F-42B5-8137-9DF3F51BA10A}">
+      <p15:sldGuideLst xmlns:p15="http://schemas.microsoft.com/office/powerpoint/2012/main"/>
+    </p:ext>
+  </p:extLst>
 </p:presentation>
 </file>
 
@@ -31916,7 +31921,7 @@
       </p:grpSpPr>
       <p:pic>
         <p:nvPicPr>
-          <p:cNvPr id="2" name="">
+          <p:cNvPr id="2" name="Obraz 1">
             <a:extLst>
               <a:ext uri="{FF2B5EF4-FFF2-40B4-BE49-F238E27FC236}">
                 <a16:creationId xmlns:a16="http://schemas.microsoft.com/office/drawing/2014/main" id="{FC5882D7-F41B-6592-BFB5-C9D64B382388}"/>
@@ -32537,7 +32542,7 @@
       </p:grpSpPr>
       <p:pic>
         <p:nvPicPr>
-          <p:cNvPr id="2" name="">
+          <p:cNvPr id="2" name="Obraz 1">
             <a:extLst>
               <a:ext uri="{FF2B5EF4-FFF2-40B4-BE49-F238E27FC236}">
                 <a16:creationId xmlns:a16="http://schemas.microsoft.com/office/drawing/2014/main" id="{01C4E581-DF32-76ED-0118-3E9FCE63140C}"/>
@@ -33158,7 +33163,7 @@
       </p:grpSpPr>
       <p:pic>
         <p:nvPicPr>
-          <p:cNvPr id="2" name="">
+          <p:cNvPr id="2" name="Obraz 1">
             <a:extLst>
               <a:ext uri="{FF2B5EF4-FFF2-40B4-BE49-F238E27FC236}">
                 <a16:creationId xmlns:a16="http://schemas.microsoft.com/office/drawing/2014/main" id="{E45DFA9A-0A45-630F-871C-054EC8440B95}"/>
@@ -33196,7 +33201,7 @@
       </p:pic>
       <p:pic>
         <p:nvPicPr>
-          <p:cNvPr id="3" name="">
+          <p:cNvPr id="3" name="Obraz 2">
             <a:extLst>
               <a:ext uri="{FF2B5EF4-FFF2-40B4-BE49-F238E27FC236}">
                 <a16:creationId xmlns:a16="http://schemas.microsoft.com/office/drawing/2014/main" id="{137F2401-B359-15BD-E772-E84C04FEFAC5}"/>
@@ -36967,7 +36972,7 @@
       </p:sp>
       <p:pic>
         <p:nvPicPr>
-          <p:cNvPr id="4" name="">
+          <p:cNvPr id="4" name="Obraz 3">
             <a:extLst>
               <a:ext uri="{FF2B5EF4-FFF2-40B4-BE49-F238E27FC236}">
                 <a16:creationId xmlns:a16="http://schemas.microsoft.com/office/drawing/2014/main" id="{FA68E19D-519D-9614-1786-D81D8768B632}"/>
@@ -37103,7 +37108,7 @@
       </p:sp>
       <p:pic>
         <p:nvPicPr>
-          <p:cNvPr id="3" name="">
+          <p:cNvPr id="3" name="Obraz 2">
             <a:extLst>
               <a:ext uri="{FF2B5EF4-FFF2-40B4-BE49-F238E27FC236}">
                 <a16:creationId xmlns:a16="http://schemas.microsoft.com/office/drawing/2014/main" id="{30E4EF79-1D25-5B2B-5611-7D6D96736C42}"/>
@@ -37141,7 +37146,7 @@
       </p:pic>
       <p:pic>
         <p:nvPicPr>
-          <p:cNvPr id="4" name="">
+          <p:cNvPr id="4" name="Obraz 3">
             <a:extLst>
               <a:ext uri="{FF2B5EF4-FFF2-40B4-BE49-F238E27FC236}">
                 <a16:creationId xmlns:a16="http://schemas.microsoft.com/office/drawing/2014/main" id="{C4E53A10-4023-F1AD-10D3-9CECF6E1DDC0}"/>
@@ -37191,8 +37196,8 @@
         </p:nvSpPr>
         <p:spPr>
           <a:xfrm>
-            <a:off x="6400799" y="2645227"/>
-            <a:ext cx="3597565" cy="936303"/>
+            <a:off x="6235262" y="1239098"/>
+            <a:ext cx="3676651" cy="3190766"/>
           </a:xfrm>
           <a:prstGeom prst="rect">
             <a:avLst/>
@@ -37203,7 +37208,7 @@
           </a:ln>
         </p:spPr>
         <p:txBody>
-          <a:bodyPr vert="horz" wrap="none" lIns="90000" tIns="45000" rIns="90000" bIns="45000" anchorCtr="0" compatLnSpc="0">
+          <a:bodyPr vert="horz" wrap="square" lIns="90000" tIns="45000" rIns="90000" bIns="45000" anchorCtr="0" compatLnSpc="0">
             <a:spAutoFit/>
           </a:bodyPr>
           <a:lstStyle/>
@@ -37234,7 +37239,7 @@
             </a:r>
           </a:p>
           <a:p>
-            <a:pPr marL="0" marR="0" lvl="0" indent="0" rtl="0" hangingPunct="0">
+            <a:pPr marL="285750" marR="0" lvl="0" indent="-285750" rtl="0" hangingPunct="0">
               <a:lnSpc>
                 <a:spcPct val="100000"/>
               </a:lnSpc>
@@ -37244,23 +37249,21 @@
               <a:spcAft>
                 <a:spcPts val="0"/>
               </a:spcAft>
-              <a:buNone/>
+              <a:buFont typeface="Arial" panose="020B0604020202020204" pitchFamily="34" charset="0"/>
+              <a:buChar char="•"/>
               <a:tabLst/>
             </a:pPr>
             <a:r>
-              <a:rPr lang="pl-PL" sz="1800" b="0" i="0" u="none" strike="noStrike" kern="1200" cap="none" dirty="0">
-                <a:ln>
-                  <a:noFill/>
-                </a:ln>
+              <a:rPr lang="pl-PL" dirty="0">
                 <a:latin typeface="Nimbus Sans" pitchFamily="18"/>
                 <a:ea typeface="Nimbus Sans" pitchFamily="2"/>
                 <a:cs typeface="FreeSerif" pitchFamily="2"/>
               </a:rPr>
-              <a:t>T1 wykonuje wszystkie obliczenia, </a:t>
-            </a:r>
-          </a:p>
-          <a:p>
-            <a:pPr marL="0" marR="0" lvl="0" indent="0" rtl="0" hangingPunct="0">
+              <a:t>T1 – wczytuje dane</a:t>
+            </a:r>
+          </a:p>
+          <a:p>
+            <a:pPr marL="285750" marR="0" lvl="0" indent="-285750" rtl="0" hangingPunct="0">
               <a:lnSpc>
                 <a:spcPct val="100000"/>
               </a:lnSpc>
@@ -37270,7 +37273,8 @@
               <a:spcAft>
                 <a:spcPts val="0"/>
               </a:spcAft>
-              <a:buNone/>
+              <a:buFont typeface="Arial" panose="020B0604020202020204" pitchFamily="34" charset="0"/>
+              <a:buChar char="•"/>
               <a:tabLst/>
             </a:pPr>
             <a:r>
@@ -37282,9 +37286,85 @@
                 <a:ea typeface="Nimbus Sans" pitchFamily="2"/>
                 <a:cs typeface="FreeSerif" pitchFamily="2"/>
               </a:rPr>
-              <a:t>podczas gdy T2 jest funkcją końcową</a:t>
-            </a:r>
-            <a:endParaRPr lang="en-US" sz="1800" b="0" i="0" u="none" strike="noStrike" kern="1200" cap="none" dirty="0">
+              <a:t>T2 – wykonuje obliczenia: dzieli dane na trzy zbiory według obliczonych progów cech „</a:t>
+            </a:r>
+            <a:r>
+              <a:rPr lang="pl-PL" sz="1800" b="0" i="0" u="none" strike="noStrike" kern="1200" cap="none" dirty="0" err="1">
+                <a:ln>
+                  <a:noFill/>
+                </a:ln>
+                <a:latin typeface="Nimbus Sans" pitchFamily="18"/>
+                <a:ea typeface="Nimbus Sans" pitchFamily="2"/>
+                <a:cs typeface="FreeSerif" pitchFamily="2"/>
+              </a:rPr>
+              <a:t>loudness</a:t>
+            </a:r>
+            <a:r>
+              <a:rPr lang="pl-PL" sz="1800" b="0" i="0" u="none" strike="noStrike" kern="1200" cap="none" dirty="0">
+                <a:ln>
+                  <a:noFill/>
+                </a:ln>
+                <a:latin typeface="Nimbus Sans" pitchFamily="18"/>
+                <a:ea typeface="Nimbus Sans" pitchFamily="2"/>
+                <a:cs typeface="FreeSerif" pitchFamily="2"/>
+              </a:rPr>
+              <a:t>”, w każdym z tych </a:t>
+            </a:r>
+            <a:r>
+              <a:rPr lang="pl-PL" dirty="0">
+                <a:latin typeface="Nimbus Sans" pitchFamily="18"/>
+                <a:ea typeface="Nimbus Sans" pitchFamily="2"/>
+                <a:cs typeface="FreeSerif" pitchFamily="2"/>
+              </a:rPr>
+              <a:t>z</a:t>
+            </a:r>
+            <a:r>
+              <a:rPr lang="pl-PL" sz="1800" b="0" i="0" u="none" strike="noStrike" kern="1200" cap="none" dirty="0">
+                <a:ln>
+                  <a:noFill/>
+                </a:ln>
+                <a:latin typeface="Nimbus Sans" pitchFamily="18"/>
+                <a:ea typeface="Nimbus Sans" pitchFamily="2"/>
+                <a:cs typeface="FreeSerif" pitchFamily="2"/>
+              </a:rPr>
+              <a:t>biorów grupuje dane po gatunku </a:t>
+            </a:r>
+            <a:r>
+              <a:rPr lang="pl-PL" dirty="0">
+                <a:latin typeface="Nimbus Sans" pitchFamily="18"/>
+                <a:ea typeface="Nimbus Sans" pitchFamily="2"/>
+                <a:cs typeface="FreeSerif" pitchFamily="2"/>
+              </a:rPr>
+              <a:t>muzycznym i zlicza ile jest </a:t>
+            </a:r>
+            <a:r>
+              <a:rPr lang="pl-PL" sz="1800" b="0" i="0" u="none" strike="noStrike" kern="1200" cap="none" dirty="0">
+                <a:ln>
+                  <a:noFill/>
+                </a:ln>
+                <a:latin typeface="Nimbus Sans" pitchFamily="18"/>
+                <a:ea typeface="Nimbus Sans" pitchFamily="2"/>
+                <a:cs typeface="FreeSerif" pitchFamily="2"/>
+              </a:rPr>
+              <a:t>utworów danym zakresie </a:t>
+            </a:r>
+            <a:r>
+              <a:rPr lang="pl-PL" dirty="0" err="1">
+                <a:latin typeface="Nimbus Sans" pitchFamily="18"/>
+                <a:ea typeface="Nimbus Sans" pitchFamily="2"/>
+                <a:cs typeface="FreeSerif" pitchFamily="2"/>
+              </a:rPr>
+              <a:t>loudness</a:t>
+            </a:r>
+            <a:r>
+              <a:rPr lang="pl-PL" dirty="0">
+                <a:latin typeface="Nimbus Sans" pitchFamily="18"/>
+                <a:ea typeface="Nimbus Sans" pitchFamily="2"/>
+                <a:cs typeface="FreeSerif" pitchFamily="2"/>
+              </a:rPr>
+              <a:t> o określonym gatunku. Na koniec zestawia razem te wyniki.</a:t>
+            </a:r>
+            <a:endParaRPr lang="pl-PL" sz="1800" b="0" i="0" u="none" strike="noStrike" kern="1200" cap="none" dirty="0">
               <a:ln>
                 <a:noFill/>
               </a:ln>
@@ -37407,8 +37487,8 @@
         </p:nvSpPr>
         <p:spPr>
           <a:xfrm>
-            <a:off x="6400799" y="2743199"/>
-            <a:ext cx="3483046" cy="936303"/>
+            <a:off x="6342157" y="1943618"/>
+            <a:ext cx="2904320" cy="1781726"/>
           </a:xfrm>
           <a:prstGeom prst="rect">
             <a:avLst/>
@@ -37419,7 +37499,7 @@
           </a:ln>
         </p:spPr>
         <p:txBody>
-          <a:bodyPr vert="horz" wrap="none" lIns="90000" tIns="45000" rIns="90000" bIns="45000" anchorCtr="0" compatLnSpc="0">
+          <a:bodyPr vert="horz" wrap="square" lIns="90000" tIns="45000" rIns="90000" bIns="45000" anchorCtr="0" compatLnSpc="0">
             <a:spAutoFit/>
           </a:bodyPr>
           <a:lstStyle/>
@@ -37438,67 +37518,28 @@
               <a:tabLst/>
             </a:pPr>
             <a:r>
-              <a:rPr lang="pl-PL" sz="1800" b="0" i="0" u="none" strike="noStrike" kern="1200" cap="none" dirty="0">
-                <a:ln>
-                  <a:noFill/>
-                </a:ln>
+              <a:rPr lang="pl-PL" dirty="0">
                 <a:latin typeface="Nimbus Sans" pitchFamily="18"/>
                 <a:ea typeface="Nimbus Sans" pitchFamily="2"/>
                 <a:cs typeface="FreeSerif" pitchFamily="2"/>
               </a:rPr>
-              <a:t>T1 z poprzedniego DAG został </a:t>
-            </a:r>
-          </a:p>
-          <a:p>
-            <a:pPr marL="0" marR="0" lvl="0" indent="0" rtl="0" hangingPunct="0">
-              <a:lnSpc>
-                <a:spcPct val="100000"/>
-              </a:lnSpc>
-              <a:spcBef>
-                <a:spcPts val="0"/>
-              </a:spcBef>
-              <a:spcAft>
-                <a:spcPts val="0"/>
-              </a:spcAft>
-              <a:buNone/>
-              <a:tabLst/>
-            </a:pPr>
-            <a:r>
-              <a:rPr lang="pl-PL" sz="1800" b="0" i="0" u="none" strike="noStrike" kern="1200" cap="none" dirty="0">
-                <a:ln>
-                  <a:noFill/>
-                </a:ln>
+              <a:t>Ten DAG jest rozbudowaną wersją poprzedniego – zadanie T2 zostało rozbite na pięć podzadań, z których 3 można wykonywać </a:t>
+            </a:r>
+            <a:r>
+              <a:rPr lang="pl-PL" dirty="0" err="1">
                 <a:latin typeface="Nimbus Sans" pitchFamily="18"/>
                 <a:ea typeface="Nimbus Sans" pitchFamily="2"/>
                 <a:cs typeface="FreeSerif" pitchFamily="2"/>
               </a:rPr>
-              <a:t>podzielony na kilka zadań (które są </a:t>
-            </a:r>
-          </a:p>
-          <a:p>
-            <a:pPr marL="0" marR="0" lvl="0" indent="0" rtl="0" hangingPunct="0">
-              <a:lnSpc>
-                <a:spcPct val="100000"/>
-              </a:lnSpc>
-              <a:spcBef>
-                <a:spcPts val="0"/>
-              </a:spcBef>
-              <a:spcAft>
-                <a:spcPts val="0"/>
-              </a:spcAft>
-              <a:buNone/>
-              <a:tabLst/>
-            </a:pPr>
-            <a:r>
-              <a:rPr lang="pl-PL" sz="1800" b="0" i="0" u="none" strike="noStrike" kern="1200" cap="none" dirty="0">
-                <a:ln>
-                  <a:noFill/>
-                </a:ln>
+              <a:t>rówocześnie</a:t>
+            </a:r>
+            <a:r>
+              <a:rPr lang="pl-PL" dirty="0">
                 <a:latin typeface="Nimbus Sans" pitchFamily="18"/>
                 <a:ea typeface="Nimbus Sans" pitchFamily="2"/>
                 <a:cs typeface="FreeSerif" pitchFamily="2"/>
               </a:rPr>
-              <a:t>podzbiorami T1)</a:t>
+              <a:t>.</a:t>
             </a:r>
             <a:endParaRPr lang="en-US" sz="1800" b="0" i="0" u="none" strike="noStrike" kern="1200" cap="none" dirty="0">
               <a:ln>
@@ -37513,7 +37554,7 @@
       </p:sp>
       <p:pic>
         <p:nvPicPr>
-          <p:cNvPr id="4" name="">
+          <p:cNvPr id="4" name="Obraz 3">
             <a:extLst>
               <a:ext uri="{FF2B5EF4-FFF2-40B4-BE49-F238E27FC236}">
                 <a16:creationId xmlns:a16="http://schemas.microsoft.com/office/drawing/2014/main" id="{A74DCB4B-554B-A32E-6B8E-FC2F6B9D6119}"/>
@@ -37551,7 +37592,7 @@
       </p:pic>
       <p:pic>
         <p:nvPicPr>
-          <p:cNvPr id="5" name="">
+          <p:cNvPr id="5" name="Obraz 4">
             <a:extLst>
               <a:ext uri="{FF2B5EF4-FFF2-40B4-BE49-F238E27FC236}">
                 <a16:creationId xmlns:a16="http://schemas.microsoft.com/office/drawing/2014/main" id="{13CD701C-DB57-DCA2-5F47-F35D15CC957C}"/>
@@ -37687,7 +37728,7 @@
       </p:sp>
       <p:pic>
         <p:nvPicPr>
-          <p:cNvPr id="3" name="">
+          <p:cNvPr id="3" name="Obraz 2">
             <a:extLst>
               <a:ext uri="{FF2B5EF4-FFF2-40B4-BE49-F238E27FC236}">
                 <a16:creationId xmlns:a16="http://schemas.microsoft.com/office/drawing/2014/main" id="{B7C1FC70-AD2F-4FE2-13D1-990CEC3255EF}"/>
@@ -37725,7 +37766,7 @@
       </p:pic>
       <p:pic>
         <p:nvPicPr>
-          <p:cNvPr id="4" name="">
+          <p:cNvPr id="4" name="Obraz 3">
             <a:extLst>
               <a:ext uri="{FF2B5EF4-FFF2-40B4-BE49-F238E27FC236}">
                 <a16:creationId xmlns:a16="http://schemas.microsoft.com/office/drawing/2014/main" id="{98F47BC5-FBF4-E76D-A71A-7F0CB436FF49}"/>
@@ -37981,6 +38022,76 @@
               <a:ea typeface="Nimbus Sans" pitchFamily="2"/>
               <a:cs typeface="FreeSerif" pitchFamily="2"/>
             </a:endParaRPr>
+          </a:p>
+        </p:txBody>
+      </p:sp>
+      <p:sp>
+        <p:nvSpPr>
+          <p:cNvPr id="6" name="pole tekstowe 5">
+            <a:extLst>
+              <a:ext uri="{FF2B5EF4-FFF2-40B4-BE49-F238E27FC236}">
+                <a16:creationId xmlns:a16="http://schemas.microsoft.com/office/drawing/2014/main" id="{E3E32D17-6993-206C-E2C8-E6A01F8C2D56}"/>
+              </a:ext>
+            </a:extLst>
+          </p:cNvPr>
+          <p:cNvSpPr txBox="1"/>
+          <p:nvPr/>
+        </p:nvSpPr>
+        <p:spPr>
+          <a:xfrm>
+            <a:off x="1477777" y="1107274"/>
+            <a:ext cx="2073645" cy="369332"/>
+          </a:xfrm>
+          <a:prstGeom prst="rect">
+            <a:avLst/>
+          </a:prstGeom>
+          <a:noFill/>
+        </p:spPr>
+        <p:txBody>
+          <a:bodyPr wrap="none" rtlCol="0">
+            <a:spAutoFit/>
+          </a:bodyPr>
+          <a:lstStyle/>
+          <a:p>
+            <a:r>
+              <a:rPr lang="pl-PL" dirty="0"/>
+              <a:t>Wersja podstawowa</a:t>
+            </a:r>
+          </a:p>
+        </p:txBody>
+      </p:sp>
+      <p:sp>
+        <p:nvSpPr>
+          <p:cNvPr id="7" name="pole tekstowe 6">
+            <a:extLst>
+              <a:ext uri="{FF2B5EF4-FFF2-40B4-BE49-F238E27FC236}">
+                <a16:creationId xmlns:a16="http://schemas.microsoft.com/office/drawing/2014/main" id="{E9F3D2C4-8DB0-2B99-60CF-61287F98D48E}"/>
+              </a:ext>
+            </a:extLst>
+          </p:cNvPr>
+          <p:cNvSpPr txBox="1"/>
+          <p:nvPr/>
+        </p:nvSpPr>
+        <p:spPr>
+          <a:xfrm>
+            <a:off x="6526030" y="1107274"/>
+            <a:ext cx="1974900" cy="369332"/>
+          </a:xfrm>
+          <a:prstGeom prst="rect">
+            <a:avLst/>
+          </a:prstGeom>
+          <a:noFill/>
+        </p:spPr>
+        <p:txBody>
+          <a:bodyPr wrap="none" rtlCol="0">
+            <a:spAutoFit/>
+          </a:bodyPr>
+          <a:lstStyle/>
+          <a:p>
+            <a:r>
+              <a:rPr lang="pl-PL" dirty="0"/>
+              <a:t>Wersja rozszerzona</a:t>
+            </a:r>
           </a:p>
         </p:txBody>
       </p:sp>

</xml_diff>